<commit_message>
add ultima prototipação - blacklist página dash
</commit_message>
<xml_diff>
--- a/Prototipação de Dashboard/Nova-Prototipacao-Tela-Dash-EX3.pptx
+++ b/Prototipação de Dashboard/Nova-Prototipacao-Tela-Dash-EX3.pptx
@@ -14,6 +14,7 @@
     <p:sldId id="261" r:id="rId8"/>
     <p:sldId id="262" r:id="rId9"/>
     <p:sldId id="264" r:id="rId10"/>
+    <p:sldId id="265" r:id="rId11"/>
   </p:sldIdLst>
   <p:sldSz cx="12192000" cy="6858000"/>
   <p:notesSz cx="6858000" cy="9144000"/>
@@ -112,6 +113,11 @@
       </a:defRPr>
     </a:lvl9pPr>
   </p:defaultTextStyle>
+  <p:extLst>
+    <p:ext uri="{EFAFB233-063F-42B5-8137-9DF3F51BA10A}">
+      <p15:sldGuideLst xmlns:p15="http://schemas.microsoft.com/office/powerpoint/2012/main"/>
+    </p:ext>
+  </p:extLst>
 </p:presentation>
 </file>
 
@@ -262,7 +268,7 @@
           <a:p>
             <a:fld id="{E9416DDB-0D84-4340-BD26-83DA7661E594}" type="datetimeFigureOut">
               <a:rPr lang="pt-BR" smtClean="0"/>
-              <a:t>20/11/2020</a:t>
+              <a:t>21/11/2020</a:t>
             </a:fld>
             <a:endParaRPr lang="pt-BR"/>
           </a:p>
@@ -460,7 +466,7 @@
           <a:p>
             <a:fld id="{E9416DDB-0D84-4340-BD26-83DA7661E594}" type="datetimeFigureOut">
               <a:rPr lang="pt-BR" smtClean="0"/>
-              <a:t>20/11/2020</a:t>
+              <a:t>21/11/2020</a:t>
             </a:fld>
             <a:endParaRPr lang="pt-BR"/>
           </a:p>
@@ -668,7 +674,7 @@
           <a:p>
             <a:fld id="{E9416DDB-0D84-4340-BD26-83DA7661E594}" type="datetimeFigureOut">
               <a:rPr lang="pt-BR" smtClean="0"/>
-              <a:t>20/11/2020</a:t>
+              <a:t>21/11/2020</a:t>
             </a:fld>
             <a:endParaRPr lang="pt-BR"/>
           </a:p>
@@ -866,7 +872,7 @@
           <a:p>
             <a:fld id="{E9416DDB-0D84-4340-BD26-83DA7661E594}" type="datetimeFigureOut">
               <a:rPr lang="pt-BR" smtClean="0"/>
-              <a:t>20/11/2020</a:t>
+              <a:t>21/11/2020</a:t>
             </a:fld>
             <a:endParaRPr lang="pt-BR"/>
           </a:p>
@@ -1141,7 +1147,7 @@
           <a:p>
             <a:fld id="{E9416DDB-0D84-4340-BD26-83DA7661E594}" type="datetimeFigureOut">
               <a:rPr lang="pt-BR" smtClean="0"/>
-              <a:t>20/11/2020</a:t>
+              <a:t>21/11/2020</a:t>
             </a:fld>
             <a:endParaRPr lang="pt-BR"/>
           </a:p>
@@ -1406,7 +1412,7 @@
           <a:p>
             <a:fld id="{E9416DDB-0D84-4340-BD26-83DA7661E594}" type="datetimeFigureOut">
               <a:rPr lang="pt-BR" smtClean="0"/>
-              <a:t>20/11/2020</a:t>
+              <a:t>21/11/2020</a:t>
             </a:fld>
             <a:endParaRPr lang="pt-BR"/>
           </a:p>
@@ -1818,7 +1824,7 @@
           <a:p>
             <a:fld id="{E9416DDB-0D84-4340-BD26-83DA7661E594}" type="datetimeFigureOut">
               <a:rPr lang="pt-BR" smtClean="0"/>
-              <a:t>20/11/2020</a:t>
+              <a:t>21/11/2020</a:t>
             </a:fld>
             <a:endParaRPr lang="pt-BR"/>
           </a:p>
@@ -1959,7 +1965,7 @@
           <a:p>
             <a:fld id="{E9416DDB-0D84-4340-BD26-83DA7661E594}" type="datetimeFigureOut">
               <a:rPr lang="pt-BR" smtClean="0"/>
-              <a:t>20/11/2020</a:t>
+              <a:t>21/11/2020</a:t>
             </a:fld>
             <a:endParaRPr lang="pt-BR"/>
           </a:p>
@@ -2072,7 +2078,7 @@
           <a:p>
             <a:fld id="{E9416DDB-0D84-4340-BD26-83DA7661E594}" type="datetimeFigureOut">
               <a:rPr lang="pt-BR" smtClean="0"/>
-              <a:t>20/11/2020</a:t>
+              <a:t>21/11/2020</a:t>
             </a:fld>
             <a:endParaRPr lang="pt-BR"/>
           </a:p>
@@ -2383,7 +2389,7 @@
           <a:p>
             <a:fld id="{E9416DDB-0D84-4340-BD26-83DA7661E594}" type="datetimeFigureOut">
               <a:rPr lang="pt-BR" smtClean="0"/>
-              <a:t>20/11/2020</a:t>
+              <a:t>21/11/2020</a:t>
             </a:fld>
             <a:endParaRPr lang="pt-BR"/>
           </a:p>
@@ -2671,7 +2677,7 @@
           <a:p>
             <a:fld id="{E9416DDB-0D84-4340-BD26-83DA7661E594}" type="datetimeFigureOut">
               <a:rPr lang="pt-BR" smtClean="0"/>
-              <a:t>20/11/2020</a:t>
+              <a:t>21/11/2020</a:t>
             </a:fld>
             <a:endParaRPr lang="pt-BR"/>
           </a:p>
@@ -2912,7 +2918,7 @@
           <a:p>
             <a:fld id="{E9416DDB-0D84-4340-BD26-83DA7661E594}" type="datetimeFigureOut">
               <a:rPr lang="pt-BR" smtClean="0"/>
-              <a:t>20/11/2020</a:t>
+              <a:t>21/11/2020</a:t>
             </a:fld>
             <a:endParaRPr lang="pt-BR"/>
           </a:p>
@@ -3372,6 +3378,66 @@
 </p:sld>
 </file>
 
+<file path=ppt/slides/slide10.xml><?xml version="1.0" encoding="utf-8"?>
+<p:sld xmlns:a="http://schemas.openxmlformats.org/drawingml/2006/main" xmlns:r="http://schemas.openxmlformats.org/officeDocument/2006/relationships" xmlns:p="http://schemas.openxmlformats.org/presentationml/2006/main">
+  <p:cSld>
+    <p:spTree>
+      <p:nvGrpSpPr>
+        <p:cNvPr id="1" name=""/>
+        <p:cNvGrpSpPr/>
+        <p:nvPr/>
+      </p:nvGrpSpPr>
+      <p:grpSpPr>
+        <a:xfrm>
+          <a:off x="0" y="0"/>
+          <a:ext cx="0" cy="0"/>
+          <a:chOff x="0" y="0"/>
+          <a:chExt cx="0" cy="0"/>
+        </a:xfrm>
+      </p:grpSpPr>
+      <p:pic>
+        <p:nvPicPr>
+          <p:cNvPr id="3" name="Imagem 2">
+            <a:extLst>
+              <a:ext uri="{FF2B5EF4-FFF2-40B4-BE49-F238E27FC236}">
+                <a16:creationId xmlns:a16="http://schemas.microsoft.com/office/drawing/2014/main" id="{6742686B-F828-44D5-84C8-AB13A380D764}"/>
+              </a:ext>
+            </a:extLst>
+          </p:cNvPr>
+          <p:cNvPicPr>
+            <a:picLocks noChangeAspect="1"/>
+          </p:cNvPicPr>
+          <p:nvPr/>
+        </p:nvPicPr>
+        <p:blipFill>
+          <a:blip r:embed="rId2"/>
+          <a:stretch>
+            <a:fillRect/>
+          </a:stretch>
+        </p:blipFill>
+        <p:spPr>
+          <a:xfrm>
+            <a:off x="1243804" y="384146"/>
+            <a:ext cx="9704392" cy="6089707"/>
+          </a:xfrm>
+          <a:prstGeom prst="rect">
+            <a:avLst/>
+          </a:prstGeom>
+        </p:spPr>
+      </p:pic>
+    </p:spTree>
+    <p:extLst>
+      <p:ext uri="{BB962C8B-B14F-4D97-AF65-F5344CB8AC3E}">
+        <p14:creationId xmlns:p14="http://schemas.microsoft.com/office/powerpoint/2010/main" val="1745551553"/>
+      </p:ext>
+    </p:extLst>
+  </p:cSld>
+  <p:clrMapOvr>
+    <a:masterClrMapping/>
+  </p:clrMapOvr>
+</p:sld>
+</file>
+
 <file path=ppt/slides/slide2.xml><?xml version="1.0" encoding="utf-8"?>
 <p:sld xmlns:a="http://schemas.openxmlformats.org/drawingml/2006/main" xmlns:r="http://schemas.openxmlformats.org/officeDocument/2006/relationships" xmlns:p="http://schemas.openxmlformats.org/presentationml/2006/main">
   <p:cSld>
@@ -3948,6 +4014,36 @@
           <a:chExt cx="0" cy="0"/>
         </a:xfrm>
       </p:grpSpPr>
+      <p:pic>
+        <p:nvPicPr>
+          <p:cNvPr id="3" name="Imagem 2">
+            <a:extLst>
+              <a:ext uri="{FF2B5EF4-FFF2-40B4-BE49-F238E27FC236}">
+                <a16:creationId xmlns:a16="http://schemas.microsoft.com/office/drawing/2014/main" id="{83D7C333-5F41-4E67-9E65-9E4CDBADB1F4}"/>
+              </a:ext>
+            </a:extLst>
+          </p:cNvPr>
+          <p:cNvPicPr>
+            <a:picLocks noChangeAspect="1"/>
+          </p:cNvPicPr>
+          <p:nvPr/>
+        </p:nvPicPr>
+        <p:blipFill>
+          <a:blip r:embed="rId2"/>
+          <a:stretch>
+            <a:fillRect/>
+          </a:stretch>
+        </p:blipFill>
+        <p:spPr>
+          <a:xfrm>
+            <a:off x="1112639" y="308522"/>
+            <a:ext cx="9966722" cy="6240955"/>
+          </a:xfrm>
+          <a:prstGeom prst="rect">
+            <a:avLst/>
+          </a:prstGeom>
+        </p:spPr>
+      </p:pic>
     </p:spTree>
     <p:extLst>
       <p:ext uri="{BB962C8B-B14F-4D97-AF65-F5344CB8AC3E}">

</xml_diff>